<commit_message>
Modularization in progress 06/19/2020
</commit_message>
<xml_diff>
--- a/doc/pythonCANproject_v0.0.pptx
+++ b/doc/pythonCANproject_v0.0.pptx
@@ -243,7 +243,7 @@
           <a:p>
             <a:fld id="{E01E04AD-BD59-4252-933F-EBECA9245F14}" type="datetimeFigureOut">
               <a:rPr lang="ko-KR" altLang="en-US" smtClean="0"/>
-              <a:t>2020-06-04</a:t>
+              <a:t>2020-06-19</a:t>
             </a:fld>
             <a:endParaRPr lang="ko-KR" altLang="en-US"/>
           </a:p>
@@ -413,7 +413,7 @@
           <a:p>
             <a:fld id="{E01E04AD-BD59-4252-933F-EBECA9245F14}" type="datetimeFigureOut">
               <a:rPr lang="ko-KR" altLang="en-US" smtClean="0"/>
-              <a:t>2020-06-04</a:t>
+              <a:t>2020-06-19</a:t>
             </a:fld>
             <a:endParaRPr lang="ko-KR" altLang="en-US"/>
           </a:p>
@@ -593,7 +593,7 @@
           <a:p>
             <a:fld id="{E01E04AD-BD59-4252-933F-EBECA9245F14}" type="datetimeFigureOut">
               <a:rPr lang="ko-KR" altLang="en-US" smtClean="0"/>
-              <a:t>2020-06-04</a:t>
+              <a:t>2020-06-19</a:t>
             </a:fld>
             <a:endParaRPr lang="ko-KR" altLang="en-US"/>
           </a:p>
@@ -763,7 +763,7 @@
           <a:p>
             <a:fld id="{E01E04AD-BD59-4252-933F-EBECA9245F14}" type="datetimeFigureOut">
               <a:rPr lang="ko-KR" altLang="en-US" smtClean="0"/>
-              <a:t>2020-06-04</a:t>
+              <a:t>2020-06-19</a:t>
             </a:fld>
             <a:endParaRPr lang="ko-KR" altLang="en-US"/>
           </a:p>
@@ -1009,7 +1009,7 @@
           <a:p>
             <a:fld id="{E01E04AD-BD59-4252-933F-EBECA9245F14}" type="datetimeFigureOut">
               <a:rPr lang="ko-KR" altLang="en-US" smtClean="0"/>
-              <a:t>2020-06-04</a:t>
+              <a:t>2020-06-19</a:t>
             </a:fld>
             <a:endParaRPr lang="ko-KR" altLang="en-US"/>
           </a:p>
@@ -1241,7 +1241,7 @@
           <a:p>
             <a:fld id="{E01E04AD-BD59-4252-933F-EBECA9245F14}" type="datetimeFigureOut">
               <a:rPr lang="ko-KR" altLang="en-US" smtClean="0"/>
-              <a:t>2020-06-04</a:t>
+              <a:t>2020-06-19</a:t>
             </a:fld>
             <a:endParaRPr lang="ko-KR" altLang="en-US"/>
           </a:p>
@@ -1608,7 +1608,7 @@
           <a:p>
             <a:fld id="{E01E04AD-BD59-4252-933F-EBECA9245F14}" type="datetimeFigureOut">
               <a:rPr lang="ko-KR" altLang="en-US" smtClean="0"/>
-              <a:t>2020-06-04</a:t>
+              <a:t>2020-06-19</a:t>
             </a:fld>
             <a:endParaRPr lang="ko-KR" altLang="en-US"/>
           </a:p>
@@ -1726,7 +1726,7 @@
           <a:p>
             <a:fld id="{E01E04AD-BD59-4252-933F-EBECA9245F14}" type="datetimeFigureOut">
               <a:rPr lang="ko-KR" altLang="en-US" smtClean="0"/>
-              <a:t>2020-06-04</a:t>
+              <a:t>2020-06-19</a:t>
             </a:fld>
             <a:endParaRPr lang="ko-KR" altLang="en-US"/>
           </a:p>
@@ -1821,7 +1821,7 @@
           <a:p>
             <a:fld id="{E01E04AD-BD59-4252-933F-EBECA9245F14}" type="datetimeFigureOut">
               <a:rPr lang="ko-KR" altLang="en-US" smtClean="0"/>
-              <a:t>2020-06-04</a:t>
+              <a:t>2020-06-19</a:t>
             </a:fld>
             <a:endParaRPr lang="ko-KR" altLang="en-US"/>
           </a:p>
@@ -2098,7 +2098,7 @@
           <a:p>
             <a:fld id="{E01E04AD-BD59-4252-933F-EBECA9245F14}" type="datetimeFigureOut">
               <a:rPr lang="ko-KR" altLang="en-US" smtClean="0"/>
-              <a:t>2020-06-04</a:t>
+              <a:t>2020-06-19</a:t>
             </a:fld>
             <a:endParaRPr lang="ko-KR" altLang="en-US"/>
           </a:p>
@@ -2355,7 +2355,7 @@
           <a:p>
             <a:fld id="{E01E04AD-BD59-4252-933F-EBECA9245F14}" type="datetimeFigureOut">
               <a:rPr lang="ko-KR" altLang="en-US" smtClean="0"/>
-              <a:t>2020-06-04</a:t>
+              <a:t>2020-06-19</a:t>
             </a:fld>
             <a:endParaRPr lang="ko-KR" altLang="en-US"/>
           </a:p>
@@ -2568,7 +2568,7 @@
           <a:p>
             <a:fld id="{E01E04AD-BD59-4252-933F-EBECA9245F14}" type="datetimeFigureOut">
               <a:rPr lang="ko-KR" altLang="en-US" smtClean="0"/>
-              <a:t>2020-06-04</a:t>
+              <a:t>2020-06-19</a:t>
             </a:fld>
             <a:endParaRPr lang="ko-KR" altLang="en-US"/>
           </a:p>

</xml_diff>

<commit_message>
Modularization in progress 06/30/2020
</commit_message>
<xml_diff>
--- a/doc/pythonCANproject_v0.0.pptx
+++ b/doc/pythonCANproject_v0.0.pptx
@@ -243,7 +243,7 @@
           <a:p>
             <a:fld id="{E01E04AD-BD59-4252-933F-EBECA9245F14}" type="datetimeFigureOut">
               <a:rPr lang="ko-KR" altLang="en-US" smtClean="0"/>
-              <a:t>2020-06-19</a:t>
+              <a:t>2020-06-30</a:t>
             </a:fld>
             <a:endParaRPr lang="ko-KR" altLang="en-US"/>
           </a:p>
@@ -413,7 +413,7 @@
           <a:p>
             <a:fld id="{E01E04AD-BD59-4252-933F-EBECA9245F14}" type="datetimeFigureOut">
               <a:rPr lang="ko-KR" altLang="en-US" smtClean="0"/>
-              <a:t>2020-06-19</a:t>
+              <a:t>2020-06-30</a:t>
             </a:fld>
             <a:endParaRPr lang="ko-KR" altLang="en-US"/>
           </a:p>
@@ -593,7 +593,7 @@
           <a:p>
             <a:fld id="{E01E04AD-BD59-4252-933F-EBECA9245F14}" type="datetimeFigureOut">
               <a:rPr lang="ko-KR" altLang="en-US" smtClean="0"/>
-              <a:t>2020-06-19</a:t>
+              <a:t>2020-06-30</a:t>
             </a:fld>
             <a:endParaRPr lang="ko-KR" altLang="en-US"/>
           </a:p>
@@ -763,7 +763,7 @@
           <a:p>
             <a:fld id="{E01E04AD-BD59-4252-933F-EBECA9245F14}" type="datetimeFigureOut">
               <a:rPr lang="ko-KR" altLang="en-US" smtClean="0"/>
-              <a:t>2020-06-19</a:t>
+              <a:t>2020-06-30</a:t>
             </a:fld>
             <a:endParaRPr lang="ko-KR" altLang="en-US"/>
           </a:p>
@@ -1009,7 +1009,7 @@
           <a:p>
             <a:fld id="{E01E04AD-BD59-4252-933F-EBECA9245F14}" type="datetimeFigureOut">
               <a:rPr lang="ko-KR" altLang="en-US" smtClean="0"/>
-              <a:t>2020-06-19</a:t>
+              <a:t>2020-06-30</a:t>
             </a:fld>
             <a:endParaRPr lang="ko-KR" altLang="en-US"/>
           </a:p>
@@ -1241,7 +1241,7 @@
           <a:p>
             <a:fld id="{E01E04AD-BD59-4252-933F-EBECA9245F14}" type="datetimeFigureOut">
               <a:rPr lang="ko-KR" altLang="en-US" smtClean="0"/>
-              <a:t>2020-06-19</a:t>
+              <a:t>2020-06-30</a:t>
             </a:fld>
             <a:endParaRPr lang="ko-KR" altLang="en-US"/>
           </a:p>
@@ -1608,7 +1608,7 @@
           <a:p>
             <a:fld id="{E01E04AD-BD59-4252-933F-EBECA9245F14}" type="datetimeFigureOut">
               <a:rPr lang="ko-KR" altLang="en-US" smtClean="0"/>
-              <a:t>2020-06-19</a:t>
+              <a:t>2020-06-30</a:t>
             </a:fld>
             <a:endParaRPr lang="ko-KR" altLang="en-US"/>
           </a:p>
@@ -1726,7 +1726,7 @@
           <a:p>
             <a:fld id="{E01E04AD-BD59-4252-933F-EBECA9245F14}" type="datetimeFigureOut">
               <a:rPr lang="ko-KR" altLang="en-US" smtClean="0"/>
-              <a:t>2020-06-19</a:t>
+              <a:t>2020-06-30</a:t>
             </a:fld>
             <a:endParaRPr lang="ko-KR" altLang="en-US"/>
           </a:p>
@@ -1821,7 +1821,7 @@
           <a:p>
             <a:fld id="{E01E04AD-BD59-4252-933F-EBECA9245F14}" type="datetimeFigureOut">
               <a:rPr lang="ko-KR" altLang="en-US" smtClean="0"/>
-              <a:t>2020-06-19</a:t>
+              <a:t>2020-06-30</a:t>
             </a:fld>
             <a:endParaRPr lang="ko-KR" altLang="en-US"/>
           </a:p>
@@ -2098,7 +2098,7 @@
           <a:p>
             <a:fld id="{E01E04AD-BD59-4252-933F-EBECA9245F14}" type="datetimeFigureOut">
               <a:rPr lang="ko-KR" altLang="en-US" smtClean="0"/>
-              <a:t>2020-06-19</a:t>
+              <a:t>2020-06-30</a:t>
             </a:fld>
             <a:endParaRPr lang="ko-KR" altLang="en-US"/>
           </a:p>
@@ -2355,7 +2355,7 @@
           <a:p>
             <a:fld id="{E01E04AD-BD59-4252-933F-EBECA9245F14}" type="datetimeFigureOut">
               <a:rPr lang="ko-KR" altLang="en-US" smtClean="0"/>
-              <a:t>2020-06-19</a:t>
+              <a:t>2020-06-30</a:t>
             </a:fld>
             <a:endParaRPr lang="ko-KR" altLang="en-US"/>
           </a:p>
@@ -2568,7 +2568,7 @@
           <a:p>
             <a:fld id="{E01E04AD-BD59-4252-933F-EBECA9245F14}" type="datetimeFigureOut">
               <a:rPr lang="ko-KR" altLang="en-US" smtClean="0"/>
-              <a:t>2020-06-19</a:t>
+              <a:t>2020-06-30</a:t>
             </a:fld>
             <a:endParaRPr lang="ko-KR" altLang="en-US"/>
           </a:p>
@@ -5383,6 +5383,49 @@
           </a:p>
         </p:txBody>
       </p:sp>
+      <p:sp>
+        <p:nvSpPr>
+          <p:cNvPr id="52" name="TextBox 51"/>
+          <p:cNvSpPr txBox="1"/>
+          <p:nvPr/>
+        </p:nvSpPr>
+        <p:spPr>
+          <a:xfrm>
+            <a:off x="23491025" y="15441040"/>
+            <a:ext cx="575799" cy="369332"/>
+          </a:xfrm>
+          <a:prstGeom prst="rect">
+            <a:avLst/>
+          </a:prstGeom>
+          <a:noFill/>
+          <a:ln>
+            <a:solidFill>
+              <a:schemeClr val="tx1"/>
+            </a:solidFill>
+          </a:ln>
+        </p:spPr>
+        <p:txBody>
+          <a:bodyPr wrap="none" rtlCol="0">
+            <a:spAutoFit/>
+          </a:bodyPr>
+          <a:lstStyle/>
+          <a:p>
+            <a:r>
+              <a:rPr lang="en-US" altLang="ko-KR" dirty="0" smtClean="0">
+                <a:solidFill>
+                  <a:srgbClr val="FF0000"/>
+                </a:solidFill>
+              </a:rPr>
+              <a:t>DBC</a:t>
+            </a:r>
+            <a:endParaRPr lang="ko-KR" altLang="en-US" dirty="0">
+              <a:solidFill>
+                <a:srgbClr val="FF0000"/>
+              </a:solidFill>
+            </a:endParaRPr>
+          </a:p>
+        </p:txBody>
+      </p:sp>
     </p:spTree>
     <p:extLst>
       <p:ext uri="{BB962C8B-B14F-4D97-AF65-F5344CB8AC3E}">

</xml_diff>